<commit_message>
final draft, TODO:test accuracy, input real numbers
</commit_message>
<xml_diff>
--- a/Prepoznavanje ročno napisanih števk.pptx
+++ b/Prepoznavanje ročno napisanih števk.pptx
@@ -5922,11 +5922,11 @@
           <a:p>
             <a:r>
               <a:rPr lang="sl-SI" dirty="0"/>
-              <a:t>M</a:t>
+              <a:t>u</a:t>
             </a:r>
             <a:r>
               <a:rPr lang="en-SI" dirty="0" err="1"/>
-              <a:t>etoda</a:t>
+              <a:t>porabljeni</a:t>
             </a:r>
             <a:r>
               <a:rPr lang="en-SI" dirty="0"/>
@@ -5934,48 +5934,1068 @@
             </a:r>
             <a:r>
               <a:rPr lang="en-SI" dirty="0" err="1"/>
-              <a:t>najmanjših</a:t>
-            </a:r>
-            <a:r>
-              <a:rPr lang="en-SI" dirty="0"/>
-              <a:t> </a:t>
-            </a:r>
-            <a:r>
-              <a:rPr lang="en-SI" dirty="0" err="1"/>
-              <a:t>kvadratov</a:t>
+              <a:t>metodi</a:t>
             </a:r>
             <a:endParaRPr lang="en-SI" dirty="0"/>
           </a:p>
         </p:txBody>
       </p:sp>
-      <p:sp>
-        <p:nvSpPr>
-          <p:cNvPr id="3" name="Content Placeholder 2">
+      <mc:AlternateContent xmlns:mc="http://schemas.openxmlformats.org/markup-compatibility/2006">
+        <mc:Choice xmlns:a14="http://schemas.microsoft.com/office/drawing/2010/main" Requires="a14">
+          <p:sp>
+            <p:nvSpPr>
+              <p:cNvPr id="3" name="Content Placeholder 2">
+                <a:extLst>
+                  <a:ext uri="{FF2B5EF4-FFF2-40B4-BE49-F238E27FC236}">
+                    <a16:creationId xmlns:a16="http://schemas.microsoft.com/office/drawing/2014/main" id="{630E606C-B921-4403-8FD3-DB5E091E0E11}"/>
+                  </a:ext>
+                </a:extLst>
+              </p:cNvPr>
+              <p:cNvSpPr>
+                <a:spLocks noGrp="1"/>
+              </p:cNvSpPr>
+              <p:nvPr>
+                <p:ph idx="1"/>
+              </p:nvPr>
+            </p:nvSpPr>
+            <p:spPr/>
+            <p:txBody>
+              <a:bodyPr anchor="ctr"/>
+              <a:lstStyle/>
+              <a:p>
+                <a:r>
+                  <a:rPr lang="en-SI" dirty="0"/>
+                  <a:t>Uporaba </a:t>
+                </a:r>
+                <a:r>
+                  <a:rPr lang="en-SI" dirty="0" err="1"/>
+                  <a:t>metode</a:t>
+                </a:r>
+                <a:r>
+                  <a:rPr lang="en-SI" dirty="0"/>
+                  <a:t> </a:t>
+                </a:r>
+                <a:r>
+                  <a:rPr lang="en-SI" dirty="0" err="1"/>
+                  <a:t>najmanjših</a:t>
+                </a:r>
+                <a:r>
+                  <a:rPr lang="en-SI" dirty="0"/>
+                  <a:t> </a:t>
+                </a:r>
+                <a:r>
+                  <a:rPr lang="en-SI" dirty="0" err="1"/>
+                  <a:t>kvadratov</a:t>
+                </a:r>
+                <a:r>
+                  <a:rPr lang="en-SI" dirty="0"/>
+                  <a:t>:</a:t>
+                </a:r>
+              </a:p>
+              <a:p>
+                <a:pPr lvl="1"/>
+                <a:r>
+                  <a:rPr lang="sl-SI" dirty="0"/>
+                  <a:t>R</a:t>
+                </a:r>
+                <a:r>
+                  <a:rPr lang="en-SI" dirty="0" err="1"/>
+                  <a:t>ešujemo</a:t>
+                </a:r>
+                <a:r>
+                  <a:rPr lang="en-SI" dirty="0"/>
+                  <a:t> </a:t>
+                </a:r>
+                <a:r>
+                  <a:rPr lang="en-SI" dirty="0" err="1"/>
+                  <a:t>sistem</a:t>
+                </a:r>
+                <a:r>
+                  <a:rPr lang="en-SI" dirty="0"/>
+                  <a:t> </a:t>
+                </a:r>
+                <a14:m>
+                  <m:oMath xmlns:m="http://schemas.openxmlformats.org/officeDocument/2006/math">
+                    <m:sSub>
+                      <m:sSubPr>
+                        <m:ctrlPr>
+                          <a:rPr lang="sl-SI" i="1" smtClean="0">
+                            <a:latin typeface="Cambria Math" panose="02040503050406030204" pitchFamily="18" charset="0"/>
+                          </a:rPr>
+                        </m:ctrlPr>
+                      </m:sSubPr>
+                      <m:e>
+                        <m:r>
+                          <a:rPr lang="en-SI" b="0" i="1" smtClean="0">
+                            <a:latin typeface="Cambria Math" panose="02040503050406030204" pitchFamily="18" charset="0"/>
+                          </a:rPr>
+                          <m:t>𝐴</m:t>
+                        </m:r>
+                      </m:e>
+                      <m:sub>
+                        <m:r>
+                          <a:rPr lang="en-SI" b="0" i="1" smtClean="0">
+                            <a:latin typeface="Cambria Math" panose="02040503050406030204" pitchFamily="18" charset="0"/>
+                          </a:rPr>
+                          <m:t>𝑖</m:t>
+                        </m:r>
+                      </m:sub>
+                    </m:sSub>
+                    <m:r>
+                      <a:rPr lang="en-SI" b="0" i="1" smtClean="0">
+                        <a:latin typeface="Cambria Math" panose="02040503050406030204" pitchFamily="18" charset="0"/>
+                      </a:rPr>
+                      <m:t>𝑥</m:t>
+                    </m:r>
+                    <m:r>
+                      <a:rPr lang="sl-SI" i="1" smtClean="0">
+                        <a:latin typeface="Cambria Math" panose="02040503050406030204" pitchFamily="18" charset="0"/>
+                      </a:rPr>
+                      <m:t>=</m:t>
+                    </m:r>
+                    <m:r>
+                      <a:rPr lang="en-SI" b="1" i="1" smtClean="0">
+                        <a:latin typeface="Cambria Math" panose="02040503050406030204" pitchFamily="18" charset="0"/>
+                      </a:rPr>
+                      <m:t>𝒃</m:t>
+                    </m:r>
+                  </m:oMath>
+                </a14:m>
+                <a:r>
+                  <a:rPr lang="en-SI" dirty="0"/>
+                  <a:t>, </a:t>
+                </a:r>
+                <a:r>
+                  <a:rPr lang="en-SI" dirty="0" err="1"/>
+                  <a:t>rešimo</a:t>
+                </a:r>
+                <a:r>
+                  <a:rPr lang="en-SI" dirty="0"/>
+                  <a:t> z </a:t>
+                </a:r>
+                <a:r>
+                  <a:rPr lang="en-SI" dirty="0" err="1"/>
+                  <a:t>uporabo</a:t>
+                </a:r>
+                <a:r>
+                  <a:rPr lang="en-SI" dirty="0"/>
+                  <a:t> Moore-Penrose </a:t>
+                </a:r>
+                <a:r>
+                  <a:rPr lang="en-SI" dirty="0" err="1"/>
+                  <a:t>inverza</a:t>
+                </a:r>
+                <a:r>
+                  <a:rPr lang="en-SI" dirty="0"/>
+                  <a:t>: </a:t>
+                </a:r>
+                <a14:m>
+                  <m:oMath xmlns:m="http://schemas.openxmlformats.org/officeDocument/2006/math">
+                    <m:sSub>
+                      <m:sSubPr>
+                        <m:ctrlPr>
+                          <a:rPr lang="en-SI" b="0" i="1" smtClean="0">
+                            <a:latin typeface="Cambria Math" panose="02040503050406030204" pitchFamily="18" charset="0"/>
+                          </a:rPr>
+                        </m:ctrlPr>
+                      </m:sSubPr>
+                      <m:e>
+                        <m:r>
+                          <a:rPr lang="en-SI" b="1" i="1" smtClean="0">
+                            <a:latin typeface="Cambria Math" panose="02040503050406030204" pitchFamily="18" charset="0"/>
+                          </a:rPr>
+                          <m:t>𝒙</m:t>
+                        </m:r>
+                      </m:e>
+                      <m:sub>
+                        <m:r>
+                          <a:rPr lang="en-SI" b="0" i="1" smtClean="0">
+                            <a:latin typeface="Cambria Math" panose="02040503050406030204" pitchFamily="18" charset="0"/>
+                          </a:rPr>
+                          <m:t>𝑖</m:t>
+                        </m:r>
+                      </m:sub>
+                    </m:sSub>
+                    <m:r>
+                      <a:rPr lang="en-SI" b="0" i="1" smtClean="0">
+                        <a:latin typeface="Cambria Math" panose="02040503050406030204" pitchFamily="18" charset="0"/>
+                      </a:rPr>
+                      <m:t>= </m:t>
+                    </m:r>
+                    <m:sSup>
+                      <m:sSupPr>
+                        <m:ctrlPr>
+                          <a:rPr lang="en-SI" b="0" i="1" smtClean="0">
+                            <a:latin typeface="Cambria Math" panose="02040503050406030204" pitchFamily="18" charset="0"/>
+                          </a:rPr>
+                        </m:ctrlPr>
+                      </m:sSupPr>
+                      <m:e>
+                        <m:sSub>
+                          <m:sSubPr>
+                            <m:ctrlPr>
+                              <a:rPr lang="en-SI" b="0" i="1" smtClean="0">
+                                <a:latin typeface="Cambria Math" panose="02040503050406030204" pitchFamily="18" charset="0"/>
+                              </a:rPr>
+                            </m:ctrlPr>
+                          </m:sSubPr>
+                          <m:e>
+                            <m:r>
+                              <a:rPr lang="en-SI" b="0" i="1" smtClean="0">
+                                <a:latin typeface="Cambria Math" panose="02040503050406030204" pitchFamily="18" charset="0"/>
+                              </a:rPr>
+                              <m:t>𝐴</m:t>
+                            </m:r>
+                          </m:e>
+                          <m:sub>
+                            <m:r>
+                              <a:rPr lang="en-SI" b="0" i="1" smtClean="0">
+                                <a:latin typeface="Cambria Math" panose="02040503050406030204" pitchFamily="18" charset="0"/>
+                              </a:rPr>
+                              <m:t>𝑖</m:t>
+                            </m:r>
+                          </m:sub>
+                        </m:sSub>
+                      </m:e>
+                      <m:sup>
+                        <m:r>
+                          <a:rPr lang="en-SI" b="0" i="1" smtClean="0">
+                            <a:latin typeface="Cambria Math" panose="02040503050406030204" pitchFamily="18" charset="0"/>
+                          </a:rPr>
+                          <m:t>+</m:t>
+                        </m:r>
+                      </m:sup>
+                    </m:sSup>
+                    <m:r>
+                      <a:rPr lang="en-SI" b="1" i="1" smtClean="0">
+                        <a:latin typeface="Cambria Math" panose="02040503050406030204" pitchFamily="18" charset="0"/>
+                      </a:rPr>
+                      <m:t>𝒃</m:t>
+                    </m:r>
+                  </m:oMath>
+                </a14:m>
+                <a:endParaRPr lang="en-SI" b="1" dirty="0"/>
+              </a:p>
+              <a:p>
+                <a:pPr lvl="1"/>
+                <a:r>
+                  <a:rPr lang="en-SI" dirty="0" err="1"/>
+                  <a:t>Rešitev</a:t>
+                </a:r>
+                <a:r>
+                  <a:rPr lang="en-SI" dirty="0"/>
+                  <a:t> je </a:t>
+                </a:r>
+                <a:r>
+                  <a:rPr lang="en-SI" i="1" dirty="0" err="1"/>
+                  <a:t>i</a:t>
+                </a:r>
+                <a:r>
+                  <a:rPr lang="en-SI" dirty="0"/>
+                  <a:t>, </a:t>
+                </a:r>
+                <a:r>
+                  <a:rPr lang="en-SI" dirty="0" err="1"/>
+                  <a:t>pri</a:t>
+                </a:r>
+                <a:r>
+                  <a:rPr lang="en-SI" dirty="0"/>
+                  <a:t> </a:t>
+                </a:r>
+                <a:r>
+                  <a:rPr lang="en-SI" dirty="0" err="1"/>
+                  <a:t>katerem</a:t>
+                </a:r>
+                <a:r>
+                  <a:rPr lang="en-SI" dirty="0"/>
+                  <a:t> je </a:t>
+                </a:r>
+                <a14:m>
+                  <m:oMath xmlns:m="http://schemas.openxmlformats.org/officeDocument/2006/math">
+                    <m:r>
+                      <a:rPr lang="en-SI" i="1" dirty="0" smtClean="0">
+                        <a:latin typeface="Cambria Math" panose="02040503050406030204" pitchFamily="18" charset="0"/>
+                      </a:rPr>
+                      <m:t>||</m:t>
+                    </m:r>
+                    <m:r>
+                      <a:rPr lang="sl-SI" b="1" i="1" dirty="0">
+                        <a:latin typeface="Cambria Math" panose="02040503050406030204" pitchFamily="18" charset="0"/>
+                      </a:rPr>
+                      <m:t>𝒃</m:t>
+                    </m:r>
+                    <m:r>
+                      <a:rPr lang="sl-SI" i="1" dirty="0">
+                        <a:latin typeface="Cambria Math" panose="02040503050406030204" pitchFamily="18" charset="0"/>
+                      </a:rPr>
+                      <m:t>−</m:t>
+                    </m:r>
+                    <m:sSub>
+                      <m:sSubPr>
+                        <m:ctrlPr>
+                          <a:rPr lang="sl-SI" i="1" dirty="0" smtClean="0">
+                            <a:latin typeface="Cambria Math" panose="02040503050406030204" pitchFamily="18" charset="0"/>
+                          </a:rPr>
+                        </m:ctrlPr>
+                      </m:sSubPr>
+                      <m:e>
+                        <m:r>
+                          <a:rPr lang="en-SI" b="0" i="1" dirty="0" smtClean="0">
+                            <a:latin typeface="Cambria Math" panose="02040503050406030204" pitchFamily="18" charset="0"/>
+                          </a:rPr>
+                          <m:t>𝐴</m:t>
+                        </m:r>
+                      </m:e>
+                      <m:sub>
+                        <m:r>
+                          <a:rPr lang="en-SI" b="0" i="1" dirty="0" smtClean="0">
+                            <a:latin typeface="Cambria Math" panose="02040503050406030204" pitchFamily="18" charset="0"/>
+                          </a:rPr>
+                          <m:t>𝑖</m:t>
+                        </m:r>
+                      </m:sub>
+                    </m:sSub>
+                    <m:sSub>
+                      <m:sSubPr>
+                        <m:ctrlPr>
+                          <a:rPr lang="sl-SI" i="1" dirty="0" smtClean="0">
+                            <a:latin typeface="Cambria Math" panose="02040503050406030204" pitchFamily="18" charset="0"/>
+                          </a:rPr>
+                        </m:ctrlPr>
+                      </m:sSubPr>
+                      <m:e>
+                        <m:r>
+                          <a:rPr lang="en-SI" b="1" i="1" dirty="0" smtClean="0">
+                            <a:latin typeface="Cambria Math" panose="02040503050406030204" pitchFamily="18" charset="0"/>
+                          </a:rPr>
+                          <m:t>𝒙</m:t>
+                        </m:r>
+                      </m:e>
+                      <m:sub>
+                        <m:r>
+                          <a:rPr lang="en-SI" b="0" i="1" dirty="0" smtClean="0">
+                            <a:latin typeface="Cambria Math" panose="02040503050406030204" pitchFamily="18" charset="0"/>
+                          </a:rPr>
+                          <m:t>𝑖</m:t>
+                        </m:r>
+                      </m:sub>
+                    </m:sSub>
+                    <m:r>
+                      <a:rPr lang="en-SI" i="1" dirty="0" smtClean="0">
+                        <a:latin typeface="Cambria Math" panose="02040503050406030204" pitchFamily="18" charset="0"/>
+                      </a:rPr>
+                      <m:t>||</m:t>
+                    </m:r>
+                  </m:oMath>
+                </a14:m>
+                <a:r>
+                  <a:rPr lang="en-SI" dirty="0"/>
+                  <a:t> najmanjši</a:t>
+                </a:r>
+              </a:p>
+              <a:p>
+                <a:pPr lvl="1"/>
+                <a:endParaRPr lang="en-SI" dirty="0"/>
+              </a:p>
+              <a:p>
+                <a:pPr lvl="1"/>
+                <a:endParaRPr lang="en-SI" dirty="0"/>
+              </a:p>
+              <a:p>
+                <a:r>
+                  <a:rPr lang="en-SI" dirty="0" err="1"/>
+                  <a:t>Uporaba</a:t>
+                </a:r>
+                <a:r>
+                  <a:rPr lang="en-SI" dirty="0"/>
+                  <a:t> SVD </a:t>
+                </a:r>
+                <a:r>
+                  <a:rPr lang="en-SI" dirty="0" err="1"/>
+                  <a:t>razcepa</a:t>
+                </a:r>
+                <a:endParaRPr lang="en-SI" dirty="0"/>
+              </a:p>
+              <a:p>
+                <a:pPr lvl="1"/>
+                <a:r>
+                  <a:rPr lang="en-SI" dirty="0" err="1"/>
+                  <a:t>Poračunamo</a:t>
+                </a:r>
+                <a:r>
+                  <a:rPr lang="en-SI" dirty="0"/>
+                  <a:t> </a:t>
+                </a:r>
+                <a:r>
+                  <a:rPr lang="en-SI" dirty="0" err="1"/>
+                  <a:t>singularne</a:t>
+                </a:r>
+                <a:r>
+                  <a:rPr lang="en-SI" dirty="0"/>
+                  <a:t> </a:t>
+                </a:r>
+                <a:r>
+                  <a:rPr lang="en-SI" dirty="0" err="1"/>
+                  <a:t>razcepe</a:t>
+                </a:r>
+                <a:r>
+                  <a:rPr lang="en-SI" dirty="0"/>
+                  <a:t> </a:t>
+                </a:r>
+                <a:r>
+                  <a:rPr lang="en-SI" dirty="0" err="1"/>
+                  <a:t>matrik</a:t>
+                </a:r>
+                <a:r>
+                  <a:rPr lang="en-SI" dirty="0"/>
+                  <a:t> </a:t>
+                </a:r>
+                <a14:m>
+                  <m:oMath xmlns:m="http://schemas.openxmlformats.org/officeDocument/2006/math">
+                    <m:sSub>
+                      <m:sSubPr>
+                        <m:ctrlPr>
+                          <a:rPr lang="en-SI" i="1" smtClean="0">
+                            <a:latin typeface="Cambria Math" panose="02040503050406030204" pitchFamily="18" charset="0"/>
+                          </a:rPr>
+                        </m:ctrlPr>
+                      </m:sSubPr>
+                      <m:e>
+                        <m:r>
+                          <a:rPr lang="en-SI" b="0" i="1" smtClean="0">
+                            <a:latin typeface="Cambria Math" panose="02040503050406030204" pitchFamily="18" charset="0"/>
+                          </a:rPr>
+                          <m:t>𝐴</m:t>
+                        </m:r>
+                      </m:e>
+                      <m:sub>
+                        <m:r>
+                          <a:rPr lang="en-SI" b="0" i="1" smtClean="0">
+                            <a:latin typeface="Cambria Math" panose="02040503050406030204" pitchFamily="18" charset="0"/>
+                          </a:rPr>
+                          <m:t>𝑖</m:t>
+                        </m:r>
+                        <m:r>
+                          <a:rPr lang="en-SI" b="0" i="1" smtClean="0">
+                            <a:latin typeface="Cambria Math" panose="02040503050406030204" pitchFamily="18" charset="0"/>
+                          </a:rPr>
+                          <m:t>= </m:t>
+                        </m:r>
+                      </m:sub>
+                    </m:sSub>
+                    <m:sSub>
+                      <m:sSubPr>
+                        <m:ctrlPr>
+                          <a:rPr lang="en-SI" i="1" smtClean="0">
+                            <a:latin typeface="Cambria Math" panose="02040503050406030204" pitchFamily="18" charset="0"/>
+                          </a:rPr>
+                        </m:ctrlPr>
+                      </m:sSubPr>
+                      <m:e>
+                        <m:r>
+                          <a:rPr lang="en-SI" b="0" i="1" smtClean="0">
+                            <a:latin typeface="Cambria Math" panose="02040503050406030204" pitchFamily="18" charset="0"/>
+                          </a:rPr>
+                          <m:t>𝑈</m:t>
+                        </m:r>
+                      </m:e>
+                      <m:sub>
+                        <m:r>
+                          <a:rPr lang="en-SI" b="0" i="1" smtClean="0">
+                            <a:latin typeface="Cambria Math" panose="02040503050406030204" pitchFamily="18" charset="0"/>
+                          </a:rPr>
+                          <m:t>𝑖</m:t>
+                        </m:r>
+                      </m:sub>
+                    </m:sSub>
+                    <m:sSub>
+                      <m:sSubPr>
+                        <m:ctrlPr>
+                          <a:rPr lang="en-SI" i="1" smtClean="0">
+                            <a:latin typeface="Cambria Math" panose="02040503050406030204" pitchFamily="18" charset="0"/>
+                          </a:rPr>
+                        </m:ctrlPr>
+                      </m:sSubPr>
+                      <m:e>
+                        <m:r>
+                          <a:rPr lang="en-SI" b="0" i="1" smtClean="0">
+                            <a:latin typeface="Cambria Math" panose="02040503050406030204" pitchFamily="18" charset="0"/>
+                          </a:rPr>
+                          <m:t>𝑆</m:t>
+                        </m:r>
+                      </m:e>
+                      <m:sub>
+                        <m:r>
+                          <a:rPr lang="en-SI" b="0" i="1" smtClean="0">
+                            <a:latin typeface="Cambria Math" panose="02040503050406030204" pitchFamily="18" charset="0"/>
+                          </a:rPr>
+                          <m:t>𝑖</m:t>
+                        </m:r>
+                      </m:sub>
+                    </m:sSub>
+                    <m:sSubSup>
+                      <m:sSubSupPr>
+                        <m:ctrlPr>
+                          <a:rPr lang="en-SI" i="1" smtClean="0">
+                            <a:latin typeface="Cambria Math" panose="02040503050406030204" pitchFamily="18" charset="0"/>
+                          </a:rPr>
+                        </m:ctrlPr>
+                      </m:sSubSupPr>
+                      <m:e>
+                        <m:r>
+                          <a:rPr lang="en-SI" b="0" i="1" smtClean="0">
+                            <a:latin typeface="Cambria Math" panose="02040503050406030204" pitchFamily="18" charset="0"/>
+                          </a:rPr>
+                          <m:t>𝑉</m:t>
+                        </m:r>
+                      </m:e>
+                      <m:sub>
+                        <m:r>
+                          <a:rPr lang="en-SI" b="0" i="1" smtClean="0">
+                            <a:latin typeface="Cambria Math" panose="02040503050406030204" pitchFamily="18" charset="0"/>
+                          </a:rPr>
+                          <m:t>𝑖</m:t>
+                        </m:r>
+                      </m:sub>
+                      <m:sup>
+                        <m:r>
+                          <a:rPr lang="en-SI" b="0" i="1" smtClean="0">
+                            <a:latin typeface="Cambria Math" panose="02040503050406030204" pitchFamily="18" charset="0"/>
+                          </a:rPr>
+                          <m:t>𝑇</m:t>
+                        </m:r>
+                      </m:sup>
+                    </m:sSubSup>
+                    <m:r>
+                      <a:rPr lang="en-SI" b="0" i="1" smtClean="0">
+                        <a:latin typeface="Cambria Math" panose="02040503050406030204" pitchFamily="18" charset="0"/>
+                      </a:rPr>
+                      <m:t>, </m:t>
+                    </m:r>
+                  </m:oMath>
+                </a14:m>
+                <a:r>
+                  <a:rPr lang="en-SI" dirty="0" err="1"/>
+                  <a:t>iščemo</a:t>
+                </a:r>
+                <a:r>
+                  <a:rPr lang="en-SI" dirty="0"/>
+                  <a:t> </a:t>
+                </a:r>
+                <a:r>
+                  <a:rPr lang="en-SI" dirty="0" err="1"/>
+                  <a:t>rešitev</a:t>
+                </a:r>
+                <a:r>
+                  <a:rPr lang="en-SI" dirty="0"/>
+                  <a:t> </a:t>
+                </a:r>
+                <a:r>
+                  <a:rPr lang="sl-SI" dirty="0"/>
+                  <a:t>S</a:t>
+                </a:r>
+                <a:r>
+                  <a:rPr lang="en-SI" dirty="0" err="1"/>
+                  <a:t>istema</a:t>
+                </a:r>
+                <a:r>
+                  <a:rPr lang="en-SI" dirty="0"/>
+                  <a:t> </a:t>
+                </a:r>
+                <a14:m>
+                  <m:oMath xmlns:m="http://schemas.openxmlformats.org/officeDocument/2006/math">
+                    <m:sSub>
+                      <m:sSubPr>
+                        <m:ctrlPr>
+                          <a:rPr lang="en-SI" i="1">
+                            <a:latin typeface="Cambria Math" panose="02040503050406030204" pitchFamily="18" charset="0"/>
+                          </a:rPr>
+                        </m:ctrlPr>
+                      </m:sSubPr>
+                      <m:e>
+                        <m:r>
+                          <a:rPr lang="en-SI" i="1">
+                            <a:latin typeface="Cambria Math" panose="02040503050406030204" pitchFamily="18" charset="0"/>
+                          </a:rPr>
+                          <m:t>𝑈</m:t>
+                        </m:r>
+                      </m:e>
+                      <m:sub>
+                        <m:r>
+                          <a:rPr lang="en-SI" i="1">
+                            <a:latin typeface="Cambria Math" panose="02040503050406030204" pitchFamily="18" charset="0"/>
+                          </a:rPr>
+                          <m:t>𝑖</m:t>
+                        </m:r>
+                      </m:sub>
+                    </m:sSub>
+                    <m:sSub>
+                      <m:sSubPr>
+                        <m:ctrlPr>
+                          <a:rPr lang="en-SI" i="1">
+                            <a:latin typeface="Cambria Math" panose="02040503050406030204" pitchFamily="18" charset="0"/>
+                          </a:rPr>
+                        </m:ctrlPr>
+                      </m:sSubPr>
+                      <m:e>
+                        <m:r>
+                          <a:rPr lang="en-SI" i="1">
+                            <a:latin typeface="Cambria Math" panose="02040503050406030204" pitchFamily="18" charset="0"/>
+                          </a:rPr>
+                          <m:t>𝑆</m:t>
+                        </m:r>
+                      </m:e>
+                      <m:sub>
+                        <m:r>
+                          <a:rPr lang="en-SI" i="1">
+                            <a:latin typeface="Cambria Math" panose="02040503050406030204" pitchFamily="18" charset="0"/>
+                          </a:rPr>
+                          <m:t>𝑖</m:t>
+                        </m:r>
+                      </m:sub>
+                    </m:sSub>
+                    <m:sSubSup>
+                      <m:sSubSupPr>
+                        <m:ctrlPr>
+                          <a:rPr lang="en-SI" i="1" smtClean="0">
+                            <a:latin typeface="Cambria Math" panose="02040503050406030204" pitchFamily="18" charset="0"/>
+                          </a:rPr>
+                        </m:ctrlPr>
+                      </m:sSubSupPr>
+                      <m:e>
+                        <m:r>
+                          <a:rPr lang="en-SI" b="1" i="1" smtClean="0">
+                            <a:latin typeface="Cambria Math" panose="02040503050406030204" pitchFamily="18" charset="0"/>
+                          </a:rPr>
+                          <m:t>𝒚</m:t>
+                        </m:r>
+                      </m:e>
+                      <m:sub>
+                        <m:r>
+                          <a:rPr lang="en-SI" i="1">
+                            <a:latin typeface="Cambria Math" panose="02040503050406030204" pitchFamily="18" charset="0"/>
+                          </a:rPr>
+                          <m:t>𝑖</m:t>
+                        </m:r>
+                      </m:sub>
+                      <m:sup/>
+                    </m:sSubSup>
+                    <m:r>
+                      <a:rPr lang="en-SI" b="0" i="1" smtClean="0">
+                        <a:latin typeface="Cambria Math" panose="02040503050406030204" pitchFamily="18" charset="0"/>
+                      </a:rPr>
+                      <m:t>=</m:t>
+                    </m:r>
+                    <m:r>
+                      <a:rPr lang="en-SI" b="1" i="1" smtClean="0">
+                        <a:latin typeface="Cambria Math" panose="02040503050406030204" pitchFamily="18" charset="0"/>
+                      </a:rPr>
+                      <m:t>𝒃</m:t>
+                    </m:r>
+                    <m:r>
+                      <a:rPr lang="en-SI" b="0" i="0" smtClean="0">
+                        <a:latin typeface="Cambria Math" panose="02040503050406030204" pitchFamily="18" charset="0"/>
+                      </a:rPr>
+                      <m:t>, </m:t>
+                    </m:r>
+                  </m:oMath>
+                </a14:m>
+                <a:r>
+                  <a:rPr lang="en-SI" dirty="0" err="1"/>
+                  <a:t>kjer</a:t>
+                </a:r>
+                <a:r>
+                  <a:rPr lang="en-SI" dirty="0"/>
+                  <a:t> je </a:t>
+                </a:r>
+                <a14:m>
+                  <m:oMath xmlns:m="http://schemas.openxmlformats.org/officeDocument/2006/math">
+                    <m:sSub>
+                      <m:sSubPr>
+                        <m:ctrlPr>
+                          <a:rPr lang="en-SI" i="1" smtClean="0">
+                            <a:latin typeface="Cambria Math" panose="02040503050406030204" pitchFamily="18" charset="0"/>
+                          </a:rPr>
+                        </m:ctrlPr>
+                      </m:sSubPr>
+                      <m:e>
+                        <m:r>
+                          <a:rPr lang="en-SI" b="1" i="1" smtClean="0">
+                            <a:latin typeface="Cambria Math" panose="02040503050406030204" pitchFamily="18" charset="0"/>
+                          </a:rPr>
+                          <m:t>𝒚</m:t>
+                        </m:r>
+                      </m:e>
+                      <m:sub>
+                        <m:r>
+                          <a:rPr lang="en-SI" b="0" i="1" smtClean="0">
+                            <a:latin typeface="Cambria Math" panose="02040503050406030204" pitchFamily="18" charset="0"/>
+                          </a:rPr>
+                          <m:t>𝑖</m:t>
+                        </m:r>
+                      </m:sub>
+                    </m:sSub>
+                    <m:r>
+                      <a:rPr lang="en-SI" b="0" i="1" smtClean="0">
+                        <a:latin typeface="Cambria Math" panose="02040503050406030204" pitchFamily="18" charset="0"/>
+                      </a:rPr>
+                      <m:t>=</m:t>
+                    </m:r>
+                    <m:sSubSup>
+                      <m:sSubSupPr>
+                        <m:ctrlPr>
+                          <a:rPr lang="en-SI" b="0" i="1" smtClean="0">
+                            <a:latin typeface="Cambria Math" panose="02040503050406030204" pitchFamily="18" charset="0"/>
+                          </a:rPr>
+                        </m:ctrlPr>
+                      </m:sSubSupPr>
+                      <m:e>
+                        <m:r>
+                          <a:rPr lang="en-SI" b="0" i="1" smtClean="0">
+                            <a:latin typeface="Cambria Math" panose="02040503050406030204" pitchFamily="18" charset="0"/>
+                          </a:rPr>
+                          <m:t>𝑉</m:t>
+                        </m:r>
+                      </m:e>
+                      <m:sub>
+                        <m:r>
+                          <a:rPr lang="en-SI" b="0" i="1" smtClean="0">
+                            <a:latin typeface="Cambria Math" panose="02040503050406030204" pitchFamily="18" charset="0"/>
+                          </a:rPr>
+                          <m:t>𝑖</m:t>
+                        </m:r>
+                      </m:sub>
+                      <m:sup>
+                        <m:r>
+                          <a:rPr lang="en-SI" b="0" i="1" smtClean="0">
+                            <a:latin typeface="Cambria Math" panose="02040503050406030204" pitchFamily="18" charset="0"/>
+                          </a:rPr>
+                          <m:t>𝑇</m:t>
+                        </m:r>
+                      </m:sup>
+                    </m:sSubSup>
+                    <m:sSubSup>
+                      <m:sSubSupPr>
+                        <m:ctrlPr>
+                          <a:rPr lang="en-SI" i="1" smtClean="0">
+                            <a:latin typeface="Cambria Math" panose="02040503050406030204" pitchFamily="18" charset="0"/>
+                          </a:rPr>
+                        </m:ctrlPr>
+                      </m:sSubSupPr>
+                      <m:e>
+                        <m:r>
+                          <a:rPr lang="en-SI" b="1" i="1" smtClean="0">
+                            <a:latin typeface="Cambria Math" panose="02040503050406030204" pitchFamily="18" charset="0"/>
+                          </a:rPr>
+                          <m:t>𝒙</m:t>
+                        </m:r>
+                      </m:e>
+                      <m:sub>
+                        <m:r>
+                          <a:rPr lang="en-SI" i="1">
+                            <a:latin typeface="Cambria Math" panose="02040503050406030204" pitchFamily="18" charset="0"/>
+                          </a:rPr>
+                          <m:t>𝑖</m:t>
+                        </m:r>
+                      </m:sub>
+                      <m:sup/>
+                    </m:sSubSup>
+                  </m:oMath>
+                </a14:m>
+                <a:endParaRPr lang="en-SI" dirty="0"/>
+              </a:p>
+              <a:p>
+                <a:pPr lvl="1"/>
+                <a:r>
+                  <a:rPr lang="en-SI" dirty="0"/>
+                  <a:t>Rešitev je </a:t>
+                </a:r>
+                <a:r>
+                  <a:rPr lang="en-SI" i="1" dirty="0" err="1"/>
+                  <a:t>i</a:t>
+                </a:r>
+                <a:r>
+                  <a:rPr lang="en-SI" dirty="0"/>
+                  <a:t>, </a:t>
+                </a:r>
+                <a:r>
+                  <a:rPr lang="en-SI" dirty="0" err="1"/>
+                  <a:t>pri</a:t>
+                </a:r>
+                <a:r>
+                  <a:rPr lang="en-SI" dirty="0"/>
+                  <a:t> </a:t>
+                </a:r>
+                <a:r>
+                  <a:rPr lang="en-SI" dirty="0" err="1"/>
+                  <a:t>katerem</a:t>
+                </a:r>
+                <a:r>
+                  <a:rPr lang="en-SI" dirty="0"/>
+                  <a:t> je </a:t>
+                </a:r>
+                <a14:m>
+                  <m:oMath xmlns:m="http://schemas.openxmlformats.org/officeDocument/2006/math">
+                    <m:r>
+                      <a:rPr lang="en-SI" i="1" dirty="0">
+                        <a:latin typeface="Cambria Math" panose="02040503050406030204" pitchFamily="18" charset="0"/>
+                      </a:rPr>
+                      <m:t>||</m:t>
+                    </m:r>
+                    <m:sSubSup>
+                      <m:sSubSupPr>
+                        <m:ctrlPr>
+                          <a:rPr lang="en-SI" i="1" dirty="0" smtClean="0">
+                            <a:latin typeface="Cambria Math" panose="02040503050406030204" pitchFamily="18" charset="0"/>
+                          </a:rPr>
+                        </m:ctrlPr>
+                      </m:sSubSupPr>
+                      <m:e>
+                        <m:r>
+                          <a:rPr lang="en-SI" b="0" i="1" dirty="0" smtClean="0">
+                            <a:latin typeface="Cambria Math" panose="02040503050406030204" pitchFamily="18" charset="0"/>
+                          </a:rPr>
+                          <m:t>𝑈</m:t>
+                        </m:r>
+                      </m:e>
+                      <m:sub>
+                        <m:r>
+                          <a:rPr lang="en-SI" b="0" i="1" dirty="0" smtClean="0">
+                            <a:latin typeface="Cambria Math" panose="02040503050406030204" pitchFamily="18" charset="0"/>
+                          </a:rPr>
+                          <m:t>𝑖</m:t>
+                        </m:r>
+                      </m:sub>
+                      <m:sup>
+                        <m:r>
+                          <a:rPr lang="en-SI" b="0" i="1" dirty="0" smtClean="0">
+                            <a:latin typeface="Cambria Math" panose="02040503050406030204" pitchFamily="18" charset="0"/>
+                          </a:rPr>
+                          <m:t>𝑇</m:t>
+                        </m:r>
+                      </m:sup>
+                    </m:sSubSup>
+                    <m:r>
+                      <a:rPr lang="sl-SI" b="1" i="1" dirty="0">
+                        <a:latin typeface="Cambria Math" panose="02040503050406030204" pitchFamily="18" charset="0"/>
+                      </a:rPr>
+                      <m:t>𝒃</m:t>
+                    </m:r>
+                    <m:r>
+                      <a:rPr lang="sl-SI" i="1" dirty="0">
+                        <a:latin typeface="Cambria Math" panose="02040503050406030204" pitchFamily="18" charset="0"/>
+                      </a:rPr>
+                      <m:t>−</m:t>
+                    </m:r>
+                    <m:sSub>
+                      <m:sSubPr>
+                        <m:ctrlPr>
+                          <a:rPr lang="en-SI" i="1">
+                            <a:latin typeface="Cambria Math" panose="02040503050406030204" pitchFamily="18" charset="0"/>
+                          </a:rPr>
+                        </m:ctrlPr>
+                      </m:sSubPr>
+                      <m:e>
+                        <m:r>
+                          <a:rPr lang="en-SI" i="1">
+                            <a:latin typeface="Cambria Math" panose="02040503050406030204" pitchFamily="18" charset="0"/>
+                          </a:rPr>
+                          <m:t>𝑆</m:t>
+                        </m:r>
+                      </m:e>
+                      <m:sub>
+                        <m:r>
+                          <a:rPr lang="en-SI" i="1">
+                            <a:latin typeface="Cambria Math" panose="02040503050406030204" pitchFamily="18" charset="0"/>
+                          </a:rPr>
+                          <m:t>𝑖</m:t>
+                        </m:r>
+                      </m:sub>
+                    </m:sSub>
+                    <m:sSubSup>
+                      <m:sSubSupPr>
+                        <m:ctrlPr>
+                          <a:rPr lang="en-SI" i="1">
+                            <a:latin typeface="Cambria Math" panose="02040503050406030204" pitchFamily="18" charset="0"/>
+                          </a:rPr>
+                        </m:ctrlPr>
+                      </m:sSubSupPr>
+                      <m:e>
+                        <m:r>
+                          <a:rPr lang="en-SI" b="1" i="1">
+                            <a:latin typeface="Cambria Math" panose="02040503050406030204" pitchFamily="18" charset="0"/>
+                          </a:rPr>
+                          <m:t>𝒚</m:t>
+                        </m:r>
+                      </m:e>
+                      <m:sub>
+                        <m:r>
+                          <a:rPr lang="en-SI" i="1">
+                            <a:latin typeface="Cambria Math" panose="02040503050406030204" pitchFamily="18" charset="0"/>
+                          </a:rPr>
+                          <m:t>𝑖</m:t>
+                        </m:r>
+                      </m:sub>
+                      <m:sup/>
+                    </m:sSubSup>
+                    <m:r>
+                      <a:rPr lang="en-SI" i="1" dirty="0">
+                        <a:latin typeface="Cambria Math" panose="02040503050406030204" pitchFamily="18" charset="0"/>
+                      </a:rPr>
+                      <m:t>||</m:t>
+                    </m:r>
+                  </m:oMath>
+                </a14:m>
+                <a:r>
+                  <a:rPr lang="en-SI" dirty="0"/>
+                  <a:t> najmanjši</a:t>
+                </a:r>
+              </a:p>
+              <a:p>
+                <a:pPr lvl="1"/>
+                <a:endParaRPr lang="en-SI" dirty="0"/>
+              </a:p>
+              <a:p>
+                <a:pPr lvl="1"/>
+                <a:endParaRPr lang="en-SI" dirty="0"/>
+              </a:p>
+            </p:txBody>
+          </p:sp>
+        </mc:Choice>
+        <mc:Fallback>
+          <p:sp>
+            <p:nvSpPr>
+              <p:cNvPr id="3" name="Content Placeholder 2">
+                <a:extLst>
+                  <a:ext uri="{FF2B5EF4-FFF2-40B4-BE49-F238E27FC236}">
+                    <a16:creationId xmlns:a16="http://schemas.microsoft.com/office/drawing/2014/main" id="{630E606C-B921-4403-8FD3-DB5E091E0E11}"/>
+                  </a:ext>
+                </a:extLst>
+              </p:cNvPr>
+              <p:cNvSpPr>
+                <a:spLocks noGrp="1" noRot="1" noChangeAspect="1" noMove="1" noResize="1" noEditPoints="1" noAdjustHandles="1" noChangeArrowheads="1" noChangeShapeType="1" noTextEdit="1"/>
+              </p:cNvSpPr>
+              <p:nvPr>
+                <p:ph idx="1"/>
+              </p:nvPr>
+            </p:nvSpPr>
+            <p:spPr>
+              <a:blipFill>
+                <a:blip r:embed="rId2"/>
+                <a:stretch>
+                  <a:fillRect l="-221" t="-2819"/>
+                </a:stretch>
+              </a:blipFill>
+            </p:spPr>
+            <p:txBody>
+              <a:bodyPr/>
+              <a:lstStyle/>
+              <a:p>
+                <a:r>
+                  <a:rPr lang="en-SI">
+                    <a:noFill/>
+                  </a:rPr>
+                  <a:t> </a:t>
+                </a:r>
+              </a:p>
+            </p:txBody>
+          </p:sp>
+        </mc:Fallback>
+      </mc:AlternateContent>
+      <p:pic>
+        <p:nvPicPr>
+          <p:cNvPr id="2052" name="Picture 4">
             <a:extLst>
               <a:ext uri="{FF2B5EF4-FFF2-40B4-BE49-F238E27FC236}">
-                <a16:creationId xmlns:a16="http://schemas.microsoft.com/office/drawing/2014/main" id="{630E606C-B921-4403-8FD3-DB5E091E0E11}"/>
+                <a16:creationId xmlns:a16="http://schemas.microsoft.com/office/drawing/2014/main" id="{3A65A55D-EFEF-4C1A-B2DE-AB9C6503202C}"/>
               </a:ext>
             </a:extLst>
           </p:cNvPr>
-          <p:cNvSpPr>
-            <a:spLocks noGrp="1"/>
-          </p:cNvSpPr>
-          <p:nvPr>
-            <p:ph idx="1"/>
-          </p:nvPr>
-        </p:nvSpPr>
-        <p:spPr/>
-        <p:txBody>
-          <a:bodyPr anchor="ctr"/>
-          <a:lstStyle/>
-          <a:p>
-            <a:r>
-              <a:rPr lang="en-SI" dirty="0"/>
-              <a:t>?</a:t>
-            </a:r>
-          </a:p>
-        </p:txBody>
-      </p:sp>
+          <p:cNvPicPr>
+            <a:picLocks noChangeAspect="1" noChangeArrowheads="1"/>
+          </p:cNvPicPr>
+          <p:nvPr/>
+        </p:nvPicPr>
+        <p:blipFill>
+          <a:blip r:embed="rId3">
+            <a:extLst>
+              <a:ext uri="{28A0092B-C50C-407E-A947-70E740481C1C}">
+                <a14:useLocalDpi xmlns:a14="http://schemas.microsoft.com/office/drawing/2010/main" val="0"/>
+              </a:ext>
+            </a:extLst>
+          </a:blip>
+          <a:srcRect/>
+          <a:stretch>
+            <a:fillRect/>
+          </a:stretch>
+        </p:blipFill>
+        <p:spPr bwMode="auto">
+          <a:xfrm>
+            <a:off x="1281026" y="3351184"/>
+            <a:ext cx="3019425" cy="390525"/>
+          </a:xfrm>
+          <a:prstGeom prst="rect">
+            <a:avLst/>
+          </a:prstGeom>
+          <a:noFill/>
+          <a:extLst>
+            <a:ext uri="{909E8E84-426E-40DD-AFC4-6F175D3DCCD1}">
+              <a14:hiddenFill xmlns:a14="http://schemas.microsoft.com/office/drawing/2010/main">
+                <a:solidFill>
+                  <a:srgbClr val="FFFFFF"/>
+                </a:solidFill>
+              </a14:hiddenFill>
+            </a:ext>
+          </a:extLst>
+        </p:spPr>
+      </p:pic>
+      <p:pic>
+        <p:nvPicPr>
+          <p:cNvPr id="2054" name="Picture 6">
+            <a:extLst>
+              <a:ext uri="{FF2B5EF4-FFF2-40B4-BE49-F238E27FC236}">
+                <a16:creationId xmlns:a16="http://schemas.microsoft.com/office/drawing/2014/main" id="{8F6A3082-A7F9-480A-9823-58A589FEA6E5}"/>
+              </a:ext>
+            </a:extLst>
+          </p:cNvPr>
+          <p:cNvPicPr>
+            <a:picLocks noChangeAspect="1" noChangeArrowheads="1"/>
+          </p:cNvPicPr>
+          <p:nvPr/>
+        </p:nvPicPr>
+        <p:blipFill>
+          <a:blip r:embed="rId4">
+            <a:extLst>
+              <a:ext uri="{28A0092B-C50C-407E-A947-70E740481C1C}">
+                <a14:useLocalDpi xmlns:a14="http://schemas.microsoft.com/office/drawing/2010/main" val="0"/>
+              </a:ext>
+            </a:extLst>
+          </a:blip>
+          <a:srcRect/>
+          <a:stretch>
+            <a:fillRect/>
+          </a:stretch>
+        </p:blipFill>
+        <p:spPr bwMode="auto">
+          <a:xfrm>
+            <a:off x="1281026" y="5439699"/>
+            <a:ext cx="3886200" cy="419100"/>
+          </a:xfrm>
+          <a:prstGeom prst="rect">
+            <a:avLst/>
+          </a:prstGeom>
+          <a:noFill/>
+          <a:extLst>
+            <a:ext uri="{909E8E84-426E-40DD-AFC4-6F175D3DCCD1}">
+              <a14:hiddenFill xmlns:a14="http://schemas.microsoft.com/office/drawing/2010/main">
+                <a:solidFill>
+                  <a:srgbClr val="FFFFFF"/>
+                </a:solidFill>
+              </a14:hiddenFill>
+            </a:ext>
+          </a:extLst>
+        </p:spPr>
+      </p:pic>
     </p:spTree>
     <p:extLst>
       <p:ext uri="{BB962C8B-B14F-4D97-AF65-F5344CB8AC3E}">
@@ -6057,16 +7077,411 @@
         </p:nvSpPr>
         <p:spPr/>
         <p:txBody>
-          <a:bodyPr/>
+          <a:bodyPr anchor="t"/>
           <a:lstStyle/>
           <a:p>
+            <a:pPr marL="0" indent="0">
+              <a:buNone/>
+            </a:pPr>
             <a:r>
               <a:rPr lang="en-SI" dirty="0"/>
-              <a:t>?</a:t>
+              <a:t>Levi </a:t>
+            </a:r>
+            <a:r>
+              <a:rPr lang="en-SI" dirty="0" err="1"/>
+              <a:t>singularni</a:t>
+            </a:r>
+            <a:r>
+              <a:rPr lang="en-SI" dirty="0"/>
+              <a:t> </a:t>
+            </a:r>
+            <a:r>
+              <a:rPr lang="en-SI" dirty="0" err="1"/>
+              <a:t>vektorji</a:t>
+            </a:r>
+            <a:r>
+              <a:rPr lang="en-SI" dirty="0"/>
+              <a:t> </a:t>
+            </a:r>
+            <a:r>
+              <a:rPr lang="en-SI" dirty="0" err="1"/>
+              <a:t>kot</a:t>
+            </a:r>
+            <a:r>
+              <a:rPr lang="en-SI" dirty="0"/>
+              <a:t> </a:t>
+            </a:r>
+            <a:r>
+              <a:rPr lang="en-SI" dirty="0" err="1"/>
+              <a:t>slike</a:t>
+            </a:r>
+            <a:r>
+              <a:rPr lang="en-SI" dirty="0"/>
+              <a:t>:</a:t>
             </a:r>
           </a:p>
         </p:txBody>
       </p:sp>
+      <p:graphicFrame>
+        <p:nvGraphicFramePr>
+          <p:cNvPr id="4" name="Table 4">
+            <a:extLst>
+              <a:ext uri="{FF2B5EF4-FFF2-40B4-BE49-F238E27FC236}">
+                <a16:creationId xmlns:a16="http://schemas.microsoft.com/office/drawing/2014/main" id="{66B72244-9C3F-469D-ADF5-2E7F3C936ADE}"/>
+              </a:ext>
+            </a:extLst>
+          </p:cNvPr>
+          <p:cNvGraphicFramePr>
+            <a:graphicFrameLocks noGrp="1"/>
+          </p:cNvGraphicFramePr>
+          <p:nvPr>
+            <p:extLst>
+              <p:ext uri="{D42A27DB-BD31-4B8C-83A1-F6EECF244321}">
+                <p14:modId xmlns:p14="http://schemas.microsoft.com/office/powerpoint/2010/main" val="448903161"/>
+              </p:ext>
+            </p:extLst>
+          </p:nvPr>
+        </p:nvGraphicFramePr>
+        <p:xfrm>
+          <a:off x="518252" y="2684477"/>
+          <a:ext cx="11155494" cy="3858293"/>
+        </p:xfrm>
+        <a:graphic>
+          <a:graphicData uri="http://schemas.openxmlformats.org/drawingml/2006/table">
+            <a:tbl>
+              <a:tblPr firstRow="1" bandRow="1">
+                <a:tableStyleId>{5C22544A-7EE6-4342-B048-85BDC9FD1C3A}</a:tableStyleId>
+              </a:tblPr>
+              <a:tblGrid>
+                <a:gridCol w="3718498">
+                  <a:extLst>
+                    <a:ext uri="{9D8B030D-6E8A-4147-A177-3AD203B41FA5}">
+                      <a16:colId xmlns:a16="http://schemas.microsoft.com/office/drawing/2014/main" val="2709634126"/>
+                    </a:ext>
+                  </a:extLst>
+                </a:gridCol>
+                <a:gridCol w="3718498">
+                  <a:extLst>
+                    <a:ext uri="{9D8B030D-6E8A-4147-A177-3AD203B41FA5}">
+                      <a16:colId xmlns:a16="http://schemas.microsoft.com/office/drawing/2014/main" val="1390442595"/>
+                    </a:ext>
+                  </a:extLst>
+                </a:gridCol>
+                <a:gridCol w="3718498">
+                  <a:extLst>
+                    <a:ext uri="{9D8B030D-6E8A-4147-A177-3AD203B41FA5}">
+                      <a16:colId xmlns:a16="http://schemas.microsoft.com/office/drawing/2014/main" val="916355053"/>
+                    </a:ext>
+                  </a:extLst>
+                </a:gridCol>
+              </a:tblGrid>
+              <a:tr h="534399">
+                <a:tc>
+                  <a:txBody>
+                    <a:bodyPr/>
+                    <a:lstStyle/>
+                    <a:p>
+                      <a:pPr algn="ctr"/>
+                      <a:r>
+                        <a:rPr lang="en-SI" dirty="0"/>
+                        <a:t>2.</a:t>
+                      </a:r>
+                    </a:p>
+                  </a:txBody>
+                  <a:tcPr/>
+                </a:tc>
+                <a:tc>
+                  <a:txBody>
+                    <a:bodyPr/>
+                    <a:lstStyle/>
+                    <a:p>
+                      <a:pPr algn="ctr"/>
+                      <a:r>
+                        <a:rPr lang="en-SI" dirty="0"/>
+                        <a:t>4.</a:t>
+                      </a:r>
+                    </a:p>
+                  </a:txBody>
+                  <a:tcPr/>
+                </a:tc>
+                <a:tc>
+                  <a:txBody>
+                    <a:bodyPr/>
+                    <a:lstStyle/>
+                    <a:p>
+                      <a:pPr algn="ctr"/>
+                      <a:r>
+                        <a:rPr lang="en-SI" dirty="0"/>
+                        <a:t>8.</a:t>
+                      </a:r>
+                    </a:p>
+                  </a:txBody>
+                  <a:tcPr/>
+                </a:tc>
+                <a:extLst>
+                  <a:ext uri="{0D108BD9-81ED-4DB2-BD59-A6C34878D82A}">
+                    <a16:rowId xmlns:a16="http://schemas.microsoft.com/office/drawing/2014/main" val="1475840540"/>
+                  </a:ext>
+                </a:extLst>
+              </a:tr>
+              <a:tr h="1661947">
+                <a:tc>
+                  <a:txBody>
+                    <a:bodyPr/>
+                    <a:lstStyle/>
+                    <a:p>
+                      <a:endParaRPr lang="en-SI" dirty="0"/>
+                    </a:p>
+                  </a:txBody>
+                  <a:tcPr/>
+                </a:tc>
+                <a:tc>
+                  <a:txBody>
+                    <a:bodyPr/>
+                    <a:lstStyle/>
+                    <a:p>
+                      <a:endParaRPr lang="en-SI"/>
+                    </a:p>
+                  </a:txBody>
+                  <a:tcPr/>
+                </a:tc>
+                <a:tc>
+                  <a:txBody>
+                    <a:bodyPr/>
+                    <a:lstStyle/>
+                    <a:p>
+                      <a:endParaRPr lang="en-SI"/>
+                    </a:p>
+                  </a:txBody>
+                  <a:tcPr/>
+                </a:tc>
+                <a:extLst>
+                  <a:ext uri="{0D108BD9-81ED-4DB2-BD59-A6C34878D82A}">
+                    <a16:rowId xmlns:a16="http://schemas.microsoft.com/office/drawing/2014/main" val="2111215941"/>
+                  </a:ext>
+                </a:extLst>
+              </a:tr>
+              <a:tr h="1661947">
+                <a:tc>
+                  <a:txBody>
+                    <a:bodyPr/>
+                    <a:lstStyle/>
+                    <a:p>
+                      <a:endParaRPr lang="en-SI" dirty="0"/>
+                    </a:p>
+                  </a:txBody>
+                  <a:tcPr/>
+                </a:tc>
+                <a:tc>
+                  <a:txBody>
+                    <a:bodyPr/>
+                    <a:lstStyle/>
+                    <a:p>
+                      <a:endParaRPr lang="en-SI" dirty="0"/>
+                    </a:p>
+                  </a:txBody>
+                  <a:tcPr/>
+                </a:tc>
+                <a:tc>
+                  <a:txBody>
+                    <a:bodyPr/>
+                    <a:lstStyle/>
+                    <a:p>
+                      <a:endParaRPr lang="en-SI" dirty="0"/>
+                    </a:p>
+                  </a:txBody>
+                  <a:tcPr/>
+                </a:tc>
+                <a:extLst>
+                  <a:ext uri="{0D108BD9-81ED-4DB2-BD59-A6C34878D82A}">
+                    <a16:rowId xmlns:a16="http://schemas.microsoft.com/office/drawing/2014/main" val="3484815691"/>
+                  </a:ext>
+                </a:extLst>
+              </a:tr>
+            </a:tbl>
+          </a:graphicData>
+        </a:graphic>
+      </p:graphicFrame>
+      <p:pic>
+        <p:nvPicPr>
+          <p:cNvPr id="5" name="Picture 4">
+            <a:extLst>
+              <a:ext uri="{FF2B5EF4-FFF2-40B4-BE49-F238E27FC236}">
+                <a16:creationId xmlns:a16="http://schemas.microsoft.com/office/drawing/2014/main" id="{54A428DC-075C-4365-8DA3-EF43F2C027FA}"/>
+              </a:ext>
+            </a:extLst>
+          </p:cNvPr>
+          <p:cNvPicPr>
+            <a:picLocks noChangeAspect="1"/>
+          </p:cNvPicPr>
+          <p:nvPr/>
+        </p:nvPicPr>
+        <p:blipFill>
+          <a:blip r:embed="rId2"/>
+          <a:stretch>
+            <a:fillRect/>
+          </a:stretch>
+        </p:blipFill>
+        <p:spPr>
+          <a:xfrm>
+            <a:off x="1600238" y="3312477"/>
+            <a:ext cx="1473607" cy="1469247"/>
+          </a:xfrm>
+          <a:prstGeom prst="rect">
+            <a:avLst/>
+          </a:prstGeom>
+        </p:spPr>
+      </p:pic>
+      <p:pic>
+        <p:nvPicPr>
+          <p:cNvPr id="6" name="Picture 5">
+            <a:extLst>
+              <a:ext uri="{FF2B5EF4-FFF2-40B4-BE49-F238E27FC236}">
+                <a16:creationId xmlns:a16="http://schemas.microsoft.com/office/drawing/2014/main" id="{AD4CF20F-AC53-4726-BE58-474660F96D07}"/>
+              </a:ext>
+            </a:extLst>
+          </p:cNvPr>
+          <p:cNvPicPr>
+            <a:picLocks noChangeAspect="1"/>
+          </p:cNvPicPr>
+          <p:nvPr/>
+        </p:nvPicPr>
+        <p:blipFill>
+          <a:blip r:embed="rId3"/>
+          <a:stretch>
+            <a:fillRect/>
+          </a:stretch>
+        </p:blipFill>
+        <p:spPr>
+          <a:xfrm>
+            <a:off x="9113770" y="3308117"/>
+            <a:ext cx="1477992" cy="1473607"/>
+          </a:xfrm>
+          <a:prstGeom prst="rect">
+            <a:avLst/>
+          </a:prstGeom>
+        </p:spPr>
+      </p:pic>
+      <p:pic>
+        <p:nvPicPr>
+          <p:cNvPr id="7" name="Picture 6">
+            <a:extLst>
+              <a:ext uri="{FF2B5EF4-FFF2-40B4-BE49-F238E27FC236}">
+                <a16:creationId xmlns:a16="http://schemas.microsoft.com/office/drawing/2014/main" id="{A9066C64-8675-4DEE-88BD-515FB270CDD5}"/>
+              </a:ext>
+            </a:extLst>
+          </p:cNvPr>
+          <p:cNvPicPr>
+            <a:picLocks noChangeAspect="1"/>
+          </p:cNvPicPr>
+          <p:nvPr/>
+        </p:nvPicPr>
+        <p:blipFill>
+          <a:blip r:embed="rId4"/>
+          <a:stretch>
+            <a:fillRect/>
+          </a:stretch>
+        </p:blipFill>
+        <p:spPr>
+          <a:xfrm>
+            <a:off x="5359195" y="3308117"/>
+            <a:ext cx="1473607" cy="1473607"/>
+          </a:xfrm>
+          <a:prstGeom prst="rect">
+            <a:avLst/>
+          </a:prstGeom>
+        </p:spPr>
+      </p:pic>
+      <p:pic>
+        <p:nvPicPr>
+          <p:cNvPr id="11" name="Picture 10">
+            <a:extLst>
+              <a:ext uri="{FF2B5EF4-FFF2-40B4-BE49-F238E27FC236}">
+                <a16:creationId xmlns:a16="http://schemas.microsoft.com/office/drawing/2014/main" id="{6C7F3101-F2B6-455E-8BCC-6BC46CB2FE23}"/>
+              </a:ext>
+            </a:extLst>
+          </p:cNvPr>
+          <p:cNvPicPr>
+            <a:picLocks noChangeAspect="1"/>
+          </p:cNvPicPr>
+          <p:nvPr/>
+        </p:nvPicPr>
+        <p:blipFill>
+          <a:blip r:embed="rId5"/>
+          <a:stretch>
+            <a:fillRect/>
+          </a:stretch>
+        </p:blipFill>
+        <p:spPr>
+          <a:xfrm>
+            <a:off x="5359194" y="4971081"/>
+            <a:ext cx="1473607" cy="1477993"/>
+          </a:xfrm>
+          <a:prstGeom prst="rect">
+            <a:avLst/>
+          </a:prstGeom>
+        </p:spPr>
+      </p:pic>
+      <p:pic>
+        <p:nvPicPr>
+          <p:cNvPr id="12" name="Picture 11">
+            <a:extLst>
+              <a:ext uri="{FF2B5EF4-FFF2-40B4-BE49-F238E27FC236}">
+                <a16:creationId xmlns:a16="http://schemas.microsoft.com/office/drawing/2014/main" id="{D7EF5412-6460-4D87-9D80-BB10A9765A77}"/>
+              </a:ext>
+            </a:extLst>
+          </p:cNvPr>
+          <p:cNvPicPr>
+            <a:picLocks noChangeAspect="1"/>
+          </p:cNvPicPr>
+          <p:nvPr/>
+        </p:nvPicPr>
+        <p:blipFill>
+          <a:blip r:embed="rId6"/>
+          <a:stretch>
+            <a:fillRect/>
+          </a:stretch>
+        </p:blipFill>
+        <p:spPr>
+          <a:xfrm>
+            <a:off x="1600238" y="4971081"/>
+            <a:ext cx="1473607" cy="1469247"/>
+          </a:xfrm>
+          <a:prstGeom prst="rect">
+            <a:avLst/>
+          </a:prstGeom>
+        </p:spPr>
+      </p:pic>
+      <p:pic>
+        <p:nvPicPr>
+          <p:cNvPr id="13" name="Picture 12">
+            <a:extLst>
+              <a:ext uri="{FF2B5EF4-FFF2-40B4-BE49-F238E27FC236}">
+                <a16:creationId xmlns:a16="http://schemas.microsoft.com/office/drawing/2014/main" id="{4CBAE42C-4B66-4D75-8CBC-D704FBAFAEA3}"/>
+              </a:ext>
+            </a:extLst>
+          </p:cNvPr>
+          <p:cNvPicPr>
+            <a:picLocks noChangeAspect="1"/>
+          </p:cNvPicPr>
+          <p:nvPr/>
+        </p:nvPicPr>
+        <p:blipFill>
+          <a:blip r:embed="rId7"/>
+          <a:stretch>
+            <a:fillRect/>
+          </a:stretch>
+        </p:blipFill>
+        <p:spPr>
+          <a:xfrm>
+            <a:off x="9118155" y="4971081"/>
+            <a:ext cx="1473607" cy="1473607"/>
+          </a:xfrm>
+          <a:prstGeom prst="rect">
+            <a:avLst/>
+          </a:prstGeom>
+        </p:spPr>
+      </p:pic>
     </p:spTree>
     <p:extLst>
       <p:ext uri="{BB962C8B-B14F-4D97-AF65-F5344CB8AC3E}">

</xml_diff>